<commit_message>
mise a jour 2
</commit_message>
<xml_diff>
--- a/Presentation Groupe 2.pptx
+++ b/Presentation Groupe 2.pptx
@@ -5,26 +5,27 @@
     <p:sldMasterId id="2147483712" r:id="rId1"/>
   </p:sldMasterIdLst>
   <p:notesMasterIdLst>
-    <p:notesMasterId r:id="rId16"/>
+    <p:notesMasterId r:id="rId17"/>
   </p:notesMasterIdLst>
   <p:handoutMasterIdLst>
-    <p:handoutMasterId r:id="rId17"/>
+    <p:handoutMasterId r:id="rId18"/>
   </p:handoutMasterIdLst>
   <p:sldIdLst>
     <p:sldId id="257" r:id="rId2"/>
-    <p:sldId id="259" r:id="rId3"/>
-    <p:sldId id="260" r:id="rId4"/>
-    <p:sldId id="261" r:id="rId5"/>
-    <p:sldId id="262" r:id="rId6"/>
-    <p:sldId id="263" r:id="rId7"/>
-    <p:sldId id="264" r:id="rId8"/>
-    <p:sldId id="265" r:id="rId9"/>
-    <p:sldId id="266" r:id="rId10"/>
-    <p:sldId id="267" r:id="rId11"/>
-    <p:sldId id="268" r:id="rId12"/>
-    <p:sldId id="269" r:id="rId13"/>
-    <p:sldId id="270" r:id="rId14"/>
-    <p:sldId id="258" r:id="rId15"/>
+    <p:sldId id="271" r:id="rId3"/>
+    <p:sldId id="259" r:id="rId4"/>
+    <p:sldId id="260" r:id="rId5"/>
+    <p:sldId id="261" r:id="rId6"/>
+    <p:sldId id="262" r:id="rId7"/>
+    <p:sldId id="263" r:id="rId8"/>
+    <p:sldId id="264" r:id="rId9"/>
+    <p:sldId id="265" r:id="rId10"/>
+    <p:sldId id="266" r:id="rId11"/>
+    <p:sldId id="267" r:id="rId12"/>
+    <p:sldId id="268" r:id="rId13"/>
+    <p:sldId id="269" r:id="rId14"/>
+    <p:sldId id="270" r:id="rId15"/>
+    <p:sldId id="258" r:id="rId16"/>
   </p:sldIdLst>
   <p:sldSz cx="12192000" cy="6858000"/>
   <p:notesSz cx="6858000" cy="9144000"/>
@@ -218,7 +219,7 @@
             <a:pPr rtl="0"/>
             <a:fld id="{2FC74BDE-6627-49B6-90F1-0334E723F64C}" type="datetime1">
               <a:rPr lang="fr-FR" smtClean="0"/>
-              <a:t>26/02/2024</a:t>
+              <a:t>27/02/2024</a:t>
             </a:fld>
             <a:endParaRPr lang="en-US" dirty="0"/>
           </a:p>
@@ -388,7 +389,7 @@
             <a:pPr rtl="0"/>
             <a:fld id="{F28DAF60-E56A-4648-8936-22D801672B6C}" type="datetime1">
               <a:rPr lang="fr-FR" smtClean="0"/>
-              <a:t>26/02/2024</a:t>
+              <a:t>27/02/2024</a:t>
             </a:fld>
             <a:endParaRPr lang="en-US"/>
           </a:p>
@@ -5698,6 +5699,214 @@
           <p:cNvPr id="2" name="Titre 1">
             <a:extLst>
               <a:ext uri="{FF2B5EF4-FFF2-40B4-BE49-F238E27FC236}">
+                <a16:creationId xmlns:a16="http://schemas.microsoft.com/office/drawing/2014/main" id="{1D004955-7170-034F-E95D-E73CA9D150F5}"/>
+              </a:ext>
+            </a:extLst>
+          </p:cNvPr>
+          <p:cNvSpPr>
+            <a:spLocks noGrp="1"/>
+          </p:cNvSpPr>
+          <p:nvPr>
+            <p:ph type="title"/>
+          </p:nvPr>
+        </p:nvSpPr>
+        <p:spPr>
+          <a:xfrm>
+            <a:off x="581192" y="702156"/>
+            <a:ext cx="11029616" cy="677193"/>
+          </a:xfrm>
+        </p:spPr>
+        <p:txBody>
+          <a:bodyPr>
+            <a:normAutofit fontScale="90000"/>
+          </a:bodyPr>
+          <a:lstStyle/>
+          <a:p>
+            <a:r>
+              <a:rPr lang="fr-FR" sz="4400" dirty="0"/>
+              <a:t>Diagramme de Cas d'Utilisation</a:t>
+            </a:r>
+          </a:p>
+        </p:txBody>
+      </p:sp>
+      <p:sp>
+        <p:nvSpPr>
+          <p:cNvPr id="3" name="Espace réservé du contenu 2">
+            <a:extLst>
+              <a:ext uri="{FF2B5EF4-FFF2-40B4-BE49-F238E27FC236}">
+                <a16:creationId xmlns:a16="http://schemas.microsoft.com/office/drawing/2014/main" id="{21F27DA6-5724-B887-17BB-D3990E70E696}"/>
+              </a:ext>
+            </a:extLst>
+          </p:cNvPr>
+          <p:cNvSpPr>
+            <a:spLocks noGrp="1"/>
+          </p:cNvSpPr>
+          <p:nvPr>
+            <p:ph idx="1"/>
+          </p:nvPr>
+        </p:nvSpPr>
+        <p:spPr>
+          <a:xfrm>
+            <a:off x="581192" y="1379349"/>
+            <a:ext cx="11029615" cy="960275"/>
+          </a:xfrm>
+        </p:spPr>
+        <p:txBody>
+          <a:bodyPr>
+            <a:normAutofit/>
+          </a:bodyPr>
+          <a:lstStyle/>
+          <a:p>
+            <a:pPr marL="0" indent="0">
+              <a:buNone/>
+            </a:pPr>
+            <a:r>
+              <a:rPr lang="fr-FR" sz="2400" b="1" dirty="0">
+                <a:solidFill>
+                  <a:schemeClr val="accent1"/>
+                </a:solidFill>
+              </a:rPr>
+              <a:t>Illustration des cas d'utilisation d'Agri-Veille</a:t>
+            </a:r>
+          </a:p>
+        </p:txBody>
+      </p:sp>
+      <p:pic>
+        <p:nvPicPr>
+          <p:cNvPr id="5" name="Image 4">
+            <a:extLst>
+              <a:ext uri="{FF2B5EF4-FFF2-40B4-BE49-F238E27FC236}">
+                <a16:creationId xmlns:a16="http://schemas.microsoft.com/office/drawing/2014/main" id="{D634AC9D-4D26-8B17-ADDA-A354ED764E46}"/>
+              </a:ext>
+            </a:extLst>
+          </p:cNvPr>
+          <p:cNvPicPr>
+            <a:picLocks noChangeAspect="1"/>
+          </p:cNvPicPr>
+          <p:nvPr/>
+        </p:nvPicPr>
+        <p:blipFill>
+          <a:blip r:embed="rId2">
+            <a:extLst>
+              <a:ext uri="{28A0092B-C50C-407E-A947-70E740481C1C}">
+                <a14:useLocalDpi xmlns:a14="http://schemas.microsoft.com/office/drawing/2010/main" val="0"/>
+              </a:ext>
+            </a:extLst>
+          </a:blip>
+          <a:srcRect/>
+          <a:stretch>
+            <a:fillRect/>
+          </a:stretch>
+        </p:blipFill>
+        <p:spPr bwMode="auto">
+          <a:xfrm>
+            <a:off x="3029659" y="2339624"/>
+            <a:ext cx="6563792" cy="4051000"/>
+          </a:xfrm>
+          <a:prstGeom prst="rect">
+            <a:avLst/>
+          </a:prstGeom>
+          <a:noFill/>
+          <a:ln>
+            <a:noFill/>
+          </a:ln>
+        </p:spPr>
+      </p:pic>
+      <p:sp>
+        <p:nvSpPr>
+          <p:cNvPr id="6" name="Espace réservé du pied de page 5">
+            <a:extLst>
+              <a:ext uri="{FF2B5EF4-FFF2-40B4-BE49-F238E27FC236}">
+                <a16:creationId xmlns:a16="http://schemas.microsoft.com/office/drawing/2014/main" id="{1CC44C46-7C58-3532-CF56-6DBCEE671726}"/>
+              </a:ext>
+            </a:extLst>
+          </p:cNvPr>
+          <p:cNvSpPr>
+            <a:spLocks noGrp="1"/>
+          </p:cNvSpPr>
+          <p:nvPr>
+            <p:ph type="ftr" sz="quarter" idx="11"/>
+          </p:nvPr>
+        </p:nvSpPr>
+        <p:spPr/>
+        <p:txBody>
+          <a:bodyPr/>
+          <a:lstStyle/>
+          <a:p>
+            <a:pPr rtl="0"/>
+            <a:r>
+              <a:rPr lang="en-US"/>
+              <a:t>Groupe 2</a:t>
+            </a:r>
+            <a:endParaRPr lang="en-US" dirty="0"/>
+          </a:p>
+        </p:txBody>
+      </p:sp>
+      <p:sp>
+        <p:nvSpPr>
+          <p:cNvPr id="9" name="Espace réservé du numéro de diapositive 8">
+            <a:extLst>
+              <a:ext uri="{FF2B5EF4-FFF2-40B4-BE49-F238E27FC236}">
+                <a16:creationId xmlns:a16="http://schemas.microsoft.com/office/drawing/2014/main" id="{A39173EF-CA36-6D20-3BDD-76E22CB95504}"/>
+              </a:ext>
+            </a:extLst>
+          </p:cNvPr>
+          <p:cNvSpPr>
+            <a:spLocks noGrp="1"/>
+          </p:cNvSpPr>
+          <p:nvPr>
+            <p:ph type="sldNum" sz="quarter" idx="12"/>
+          </p:nvPr>
+        </p:nvSpPr>
+        <p:spPr/>
+        <p:txBody>
+          <a:bodyPr/>
+          <a:lstStyle/>
+          <a:p>
+            <a:pPr rtl="0"/>
+            <a:fld id="{3A98EE3D-8CD1-4C3F-BD1C-C98C9596463C}" type="slidenum">
+              <a:rPr lang="en-US" smtClean="0"/>
+              <a:t>10</a:t>
+            </a:fld>
+            <a:endParaRPr lang="en-US" dirty="0"/>
+          </a:p>
+        </p:txBody>
+      </p:sp>
+    </p:spTree>
+    <p:extLst>
+      <p:ext uri="{BB962C8B-B14F-4D97-AF65-F5344CB8AC3E}">
+        <p14:creationId xmlns:p14="http://schemas.microsoft.com/office/powerpoint/2010/main" val="4216241999"/>
+      </p:ext>
+    </p:extLst>
+  </p:cSld>
+  <p:clrMapOvr>
+    <a:masterClrMapping/>
+  </p:clrMapOvr>
+</p:sld>
+</file>
+
+<file path=ppt/slides/slide11.xml><?xml version="1.0" encoding="utf-8"?>
+<p:sld xmlns:a="http://schemas.openxmlformats.org/drawingml/2006/main" xmlns:r="http://schemas.openxmlformats.org/officeDocument/2006/relationships" xmlns:p="http://schemas.openxmlformats.org/presentationml/2006/main">
+  <p:cSld>
+    <p:spTree>
+      <p:nvGrpSpPr>
+        <p:cNvPr id="1" name=""/>
+        <p:cNvGrpSpPr/>
+        <p:nvPr/>
+      </p:nvGrpSpPr>
+      <p:grpSpPr>
+        <a:xfrm>
+          <a:off x="0" y="0"/>
+          <a:ext cx="0" cy="0"/>
+          <a:chOff x="0" y="0"/>
+          <a:chExt cx="0" cy="0"/>
+        </a:xfrm>
+      </p:grpSpPr>
+      <p:sp>
+        <p:nvSpPr>
+          <p:cNvPr id="2" name="Titre 1">
+            <a:extLst>
+              <a:ext uri="{FF2B5EF4-FFF2-40B4-BE49-F238E27FC236}">
                 <a16:creationId xmlns:a16="http://schemas.microsoft.com/office/drawing/2014/main" id="{478B9D76-4E64-B9DE-B29B-1A06282C2C74}"/>
               </a:ext>
             </a:extLst>
@@ -5865,7 +6074,7 @@
             <a:pPr rtl="0"/>
             <a:fld id="{3A98EE3D-8CD1-4C3F-BD1C-C98C9596463C}" type="slidenum">
               <a:rPr lang="en-US" smtClean="0"/>
-              <a:t>10</a:t>
+              <a:t>11</a:t>
             </a:fld>
             <a:endParaRPr lang="en-US" dirty="0"/>
           </a:p>
@@ -5881,13 +6090,13 @@
   <p:clrMapOvr>
     <a:masterClrMapping/>
   </p:clrMapOvr>
-  <mc:AlternateContent xmlns:mc="http://schemas.openxmlformats.org/markup-compatibility/2006">
-    <mc:Choice xmlns:p14="http://schemas.microsoft.com/office/powerpoint/2010/main" Requires="p14">
+  <mc:AlternateContent xmlns:mc="http://schemas.openxmlformats.org/markup-compatibility/2006" xmlns:p14="http://schemas.microsoft.com/office/powerpoint/2010/main">
+    <mc:Choice Requires="p14">
       <p:transition spd="slow" p14:dur="1250">
         <p14:flip dir="r"/>
       </p:transition>
     </mc:Choice>
-    <mc:Fallback>
+    <mc:Fallback xmlns="">
       <p:transition spd="slow">
         <p:fade/>
       </p:transition>
@@ -5896,7 +6105,7 @@
 </p:sld>
 </file>
 
-<file path=ppt/slides/slide11.xml><?xml version="1.0" encoding="utf-8"?>
+<file path=ppt/slides/slide12.xml><?xml version="1.0" encoding="utf-8"?>
 <p:sld xmlns:a="http://schemas.openxmlformats.org/drawingml/2006/main" xmlns:r="http://schemas.openxmlformats.org/officeDocument/2006/relationships" xmlns:p="http://schemas.openxmlformats.org/presentationml/2006/main">
   <p:cSld>
     <p:spTree>
@@ -6085,7 +6294,7 @@
             <a:pPr rtl="0"/>
             <a:fld id="{3A98EE3D-8CD1-4C3F-BD1C-C98C9596463C}" type="slidenum">
               <a:rPr lang="en-US" smtClean="0"/>
-              <a:t>11</a:t>
+              <a:t>12</a:t>
             </a:fld>
             <a:endParaRPr lang="en-US" dirty="0"/>
           </a:p>
@@ -6095,132 +6304,6 @@
     <p:extLst>
       <p:ext uri="{BB962C8B-B14F-4D97-AF65-F5344CB8AC3E}">
         <p14:creationId xmlns:p14="http://schemas.microsoft.com/office/powerpoint/2010/main" val="929414181"/>
-      </p:ext>
-    </p:extLst>
-  </p:cSld>
-  <p:clrMapOvr>
-    <a:masterClrMapping/>
-  </p:clrMapOvr>
-</p:sld>
-</file>
-
-<file path=ppt/slides/slide12.xml><?xml version="1.0" encoding="utf-8"?>
-<p:sld xmlns:a="http://schemas.openxmlformats.org/drawingml/2006/main" xmlns:r="http://schemas.openxmlformats.org/officeDocument/2006/relationships" xmlns:p="http://schemas.openxmlformats.org/presentationml/2006/main">
-  <p:cSld>
-    <p:spTree>
-      <p:nvGrpSpPr>
-        <p:cNvPr id="1" name=""/>
-        <p:cNvGrpSpPr/>
-        <p:nvPr/>
-      </p:nvGrpSpPr>
-      <p:grpSpPr>
-        <a:xfrm>
-          <a:off x="0" y="0"/>
-          <a:ext cx="0" cy="0"/>
-          <a:chOff x="0" y="0"/>
-          <a:chExt cx="0" cy="0"/>
-        </a:xfrm>
-      </p:grpSpPr>
-      <p:sp>
-        <p:nvSpPr>
-          <p:cNvPr id="2" name="Titre 1">
-            <a:extLst>
-              <a:ext uri="{FF2B5EF4-FFF2-40B4-BE49-F238E27FC236}">
-                <a16:creationId xmlns:a16="http://schemas.microsoft.com/office/drawing/2014/main" id="{8217B177-FEEC-55EC-E938-FAC6D8E0AF16}"/>
-              </a:ext>
-            </a:extLst>
-          </p:cNvPr>
-          <p:cNvSpPr>
-            <a:spLocks noGrp="1"/>
-          </p:cNvSpPr>
-          <p:nvPr>
-            <p:ph type="title"/>
-          </p:nvPr>
-        </p:nvSpPr>
-        <p:spPr>
-          <a:xfrm>
-            <a:off x="581192" y="1735811"/>
-            <a:ext cx="11029616" cy="2386738"/>
-          </a:xfrm>
-        </p:spPr>
-        <p:txBody>
-          <a:bodyPr>
-            <a:normAutofit/>
-          </a:bodyPr>
-          <a:lstStyle/>
-          <a:p>
-            <a:pPr algn="ctr"/>
-            <a:r>
-              <a:rPr lang="fr-FR" sz="4000" dirty="0"/>
-              <a:t>Présentation des Interfaces de l'Application (Cas d’utilisation)</a:t>
-            </a:r>
-          </a:p>
-        </p:txBody>
-      </p:sp>
-      <p:sp>
-        <p:nvSpPr>
-          <p:cNvPr id="5" name="Espace réservé du pied de page 4">
-            <a:extLst>
-              <a:ext uri="{FF2B5EF4-FFF2-40B4-BE49-F238E27FC236}">
-                <a16:creationId xmlns:a16="http://schemas.microsoft.com/office/drawing/2014/main" id="{49D47D8E-037F-D7D5-C312-EF74CE4D2690}"/>
-              </a:ext>
-            </a:extLst>
-          </p:cNvPr>
-          <p:cNvSpPr>
-            <a:spLocks noGrp="1"/>
-          </p:cNvSpPr>
-          <p:nvPr>
-            <p:ph type="ftr" sz="quarter" idx="11"/>
-          </p:nvPr>
-        </p:nvSpPr>
-        <p:spPr/>
-        <p:txBody>
-          <a:bodyPr/>
-          <a:lstStyle/>
-          <a:p>
-            <a:pPr rtl="0"/>
-            <a:r>
-              <a:rPr lang="en-US"/>
-              <a:t>Groupe 2</a:t>
-            </a:r>
-            <a:endParaRPr lang="en-US" dirty="0"/>
-          </a:p>
-        </p:txBody>
-      </p:sp>
-      <p:sp>
-        <p:nvSpPr>
-          <p:cNvPr id="8" name="Espace réservé du numéro de diapositive 7">
-            <a:extLst>
-              <a:ext uri="{FF2B5EF4-FFF2-40B4-BE49-F238E27FC236}">
-                <a16:creationId xmlns:a16="http://schemas.microsoft.com/office/drawing/2014/main" id="{CD82467D-8CBA-2FA0-2287-6513907D8EED}"/>
-              </a:ext>
-            </a:extLst>
-          </p:cNvPr>
-          <p:cNvSpPr>
-            <a:spLocks noGrp="1"/>
-          </p:cNvSpPr>
-          <p:nvPr>
-            <p:ph type="sldNum" sz="quarter" idx="12"/>
-          </p:nvPr>
-        </p:nvSpPr>
-        <p:spPr/>
-        <p:txBody>
-          <a:bodyPr/>
-          <a:lstStyle/>
-          <a:p>
-            <a:pPr rtl="0"/>
-            <a:fld id="{3A98EE3D-8CD1-4C3F-BD1C-C98C9596463C}" type="slidenum">
-              <a:rPr lang="en-US" smtClean="0"/>
-              <a:t>12</a:t>
-            </a:fld>
-            <a:endParaRPr lang="en-US" dirty="0"/>
-          </a:p>
-        </p:txBody>
-      </p:sp>
-    </p:spTree>
-    <p:extLst>
-      <p:ext uri="{BB962C8B-B14F-4D97-AF65-F5344CB8AC3E}">
-        <p14:creationId xmlns:p14="http://schemas.microsoft.com/office/powerpoint/2010/main" val="186320830"/>
       </p:ext>
     </p:extLst>
   </p:cSld>
@@ -6252,7 +6335,7 @@
           <p:cNvPr id="2" name="Titre 1">
             <a:extLst>
               <a:ext uri="{FF2B5EF4-FFF2-40B4-BE49-F238E27FC236}">
-                <a16:creationId xmlns:a16="http://schemas.microsoft.com/office/drawing/2014/main" id="{4577FE9E-10C3-6EE1-A69F-6B7D2D9413BC}"/>
+                <a16:creationId xmlns:a16="http://schemas.microsoft.com/office/drawing/2014/main" id="{8217B177-FEEC-55EC-E938-FAC6D8E0AF16}"/>
               </a:ext>
             </a:extLst>
           </p:cNvPr>
@@ -6265,8 +6348,8 @@
         </p:nvSpPr>
         <p:spPr>
           <a:xfrm>
-            <a:off x="581192" y="702156"/>
-            <a:ext cx="11029616" cy="770183"/>
+            <a:off x="581192" y="1735811"/>
+            <a:ext cx="11029616" cy="2386738"/>
           </a:xfrm>
         </p:spPr>
         <p:txBody>
@@ -6275,129 +6358,20 @@
           </a:bodyPr>
           <a:lstStyle/>
           <a:p>
-            <a:r>
-              <a:rPr lang="fr-FR" sz="4400" dirty="0"/>
-              <a:t>Conclusion</a:t>
-            </a:r>
-          </a:p>
-        </p:txBody>
-      </p:sp>
-      <p:sp>
-        <p:nvSpPr>
-          <p:cNvPr id="3" name="Espace réservé du contenu 2">
+            <a:pPr algn="ctr"/>
+            <a:r>
+              <a:rPr lang="fr-FR" sz="4000" dirty="0"/>
+              <a:t>Présentation des Interfaces de l'Application (Cas d’utilisation)</a:t>
+            </a:r>
+          </a:p>
+        </p:txBody>
+      </p:sp>
+      <p:sp>
+        <p:nvSpPr>
+          <p:cNvPr id="5" name="Espace réservé du pied de page 4">
             <a:extLst>
               <a:ext uri="{FF2B5EF4-FFF2-40B4-BE49-F238E27FC236}">
-                <a16:creationId xmlns:a16="http://schemas.microsoft.com/office/drawing/2014/main" id="{CB26CDDF-A9D4-09A4-C16E-141C0FA1BBC0}"/>
-              </a:ext>
-            </a:extLst>
-          </p:cNvPr>
-          <p:cNvSpPr>
-            <a:spLocks noGrp="1"/>
-          </p:cNvSpPr>
-          <p:nvPr>
-            <p:ph idx="1"/>
-          </p:nvPr>
-        </p:nvSpPr>
-        <p:spPr>
-          <a:xfrm>
-            <a:off x="581192" y="1611757"/>
-            <a:ext cx="11029615" cy="3634486"/>
-          </a:xfrm>
-        </p:spPr>
-        <p:txBody>
-          <a:bodyPr/>
-          <a:lstStyle/>
-          <a:p>
-            <a:pPr algn="just">
-              <a:buFont typeface="Wingdings" panose="05000000000000000000" pitchFamily="2" charset="2"/>
-              <a:buChar char="q"/>
-            </a:pPr>
-            <a:r>
-              <a:rPr lang="fr-FR" sz="2800" dirty="0">
-                <a:solidFill>
-                  <a:schemeClr val="tx1">
-                    <a:lumMod val="95000"/>
-                    <a:lumOff val="5000"/>
-                  </a:schemeClr>
-                </a:solidFill>
-              </a:rPr>
-              <a:t>Agri-Veille offre une solution complète de veille agricole, alliant robustesse technique et convivialité.</a:t>
-            </a:r>
-          </a:p>
-          <a:p>
-            <a:pPr algn="just">
-              <a:buFont typeface="Wingdings" panose="05000000000000000000" pitchFamily="2" charset="2"/>
-              <a:buChar char="q"/>
-            </a:pPr>
-            <a:r>
-              <a:rPr lang="fr-FR" sz="2800" dirty="0">
-                <a:solidFill>
-                  <a:schemeClr val="tx1">
-                    <a:lumMod val="95000"/>
-                    <a:lumOff val="5000"/>
-                  </a:schemeClr>
-                </a:solidFill>
-              </a:rPr>
-              <a:t>Perspectives d'avenir : Intégration de fonctionnalités avancées, expansion vers de nouveaux marchés.</a:t>
-            </a:r>
-          </a:p>
-          <a:p>
-            <a:endParaRPr lang="fr-FR" dirty="0"/>
-          </a:p>
-        </p:txBody>
-      </p:sp>
-      <p:sp>
-        <p:nvSpPr>
-          <p:cNvPr id="5" name="ZoneTexte 4">
-            <a:extLst>
-              <a:ext uri="{FF2B5EF4-FFF2-40B4-BE49-F238E27FC236}">
-                <a16:creationId xmlns:a16="http://schemas.microsoft.com/office/drawing/2014/main" id="{9D745652-3E8A-6928-38E7-17F2C6F3ED5E}"/>
-              </a:ext>
-            </a:extLst>
-          </p:cNvPr>
-          <p:cNvSpPr txBox="1"/>
-          <p:nvPr/>
-        </p:nvSpPr>
-        <p:spPr>
-          <a:xfrm>
-            <a:off x="2805193" y="5129939"/>
-            <a:ext cx="6261315" cy="1107996"/>
-          </a:xfrm>
-          <a:prstGeom prst="rect">
-            <a:avLst/>
-          </a:prstGeom>
-          <a:noFill/>
-        </p:spPr>
-        <p:txBody>
-          <a:bodyPr wrap="square" rtlCol="0">
-            <a:spAutoFit/>
-          </a:bodyPr>
-          <a:lstStyle/>
-          <a:p>
-            <a:pPr algn="ctr"/>
-            <a:r>
-              <a:rPr lang="fr-FR" sz="2400" dirty="0"/>
-              <a:t>Retrouver l’application et l’ensemble du projet sur le repository GitHub suivant:</a:t>
-            </a:r>
-          </a:p>
-          <a:p>
-            <a:r>
-              <a:rPr lang="fr-FR" u="sng" dirty="0">
-                <a:solidFill>
-                  <a:schemeClr val="accent1"/>
-                </a:solidFill>
-              </a:rPr>
-              <a:t>https://github.com/Saynbemorinbewang2/Vst_Apps_2024.git</a:t>
-            </a:r>
-          </a:p>
-        </p:txBody>
-      </p:sp>
-      <p:sp>
-        <p:nvSpPr>
-          <p:cNvPr id="6" name="Espace réservé du pied de page 5">
-            <a:extLst>
-              <a:ext uri="{FF2B5EF4-FFF2-40B4-BE49-F238E27FC236}">
-                <a16:creationId xmlns:a16="http://schemas.microsoft.com/office/drawing/2014/main" id="{765512A0-2264-A2D5-38AB-20FB69203BBF}"/>
+                <a16:creationId xmlns:a16="http://schemas.microsoft.com/office/drawing/2014/main" id="{49D47D8E-037F-D7D5-C312-EF74CE4D2690}"/>
               </a:ext>
             </a:extLst>
           </p:cNvPr>
@@ -6415,18 +6389,19 @@
           <a:p>
             <a:pPr rtl="0"/>
             <a:r>
-              <a:rPr lang="en-US" dirty="0"/>
+              <a:rPr lang="en-US"/>
               <a:t>Groupe 2</a:t>
             </a:r>
-          </a:p>
-        </p:txBody>
-      </p:sp>
-      <p:sp>
-        <p:nvSpPr>
-          <p:cNvPr id="9" name="Espace réservé du numéro de diapositive 8">
+            <a:endParaRPr lang="en-US" dirty="0"/>
+          </a:p>
+        </p:txBody>
+      </p:sp>
+      <p:sp>
+        <p:nvSpPr>
+          <p:cNvPr id="8" name="Espace réservé du numéro de diapositive 7">
             <a:extLst>
               <a:ext uri="{FF2B5EF4-FFF2-40B4-BE49-F238E27FC236}">
-                <a16:creationId xmlns:a16="http://schemas.microsoft.com/office/drawing/2014/main" id="{6DDF2771-0BD6-DF1B-B09E-9A2123B944C2}"/>
+                <a16:creationId xmlns:a16="http://schemas.microsoft.com/office/drawing/2014/main" id="{CD82467D-8CBA-2FA0-2287-6513907D8EED}"/>
               </a:ext>
             </a:extLst>
           </p:cNvPr>
@@ -6454,7 +6429,7 @@
     </p:spTree>
     <p:extLst>
       <p:ext uri="{BB962C8B-B14F-4D97-AF65-F5344CB8AC3E}">
-        <p14:creationId xmlns:p14="http://schemas.microsoft.com/office/powerpoint/2010/main" val="1962157946"/>
+        <p14:creationId xmlns:p14="http://schemas.microsoft.com/office/powerpoint/2010/main" val="186320830"/>
       </p:ext>
     </p:extLst>
   </p:cSld>
@@ -6481,6 +6456,240 @@
           <a:chExt cx="0" cy="0"/>
         </a:xfrm>
       </p:grpSpPr>
+      <p:sp>
+        <p:nvSpPr>
+          <p:cNvPr id="2" name="Titre 1">
+            <a:extLst>
+              <a:ext uri="{FF2B5EF4-FFF2-40B4-BE49-F238E27FC236}">
+                <a16:creationId xmlns:a16="http://schemas.microsoft.com/office/drawing/2014/main" id="{4577FE9E-10C3-6EE1-A69F-6B7D2D9413BC}"/>
+              </a:ext>
+            </a:extLst>
+          </p:cNvPr>
+          <p:cNvSpPr>
+            <a:spLocks noGrp="1"/>
+          </p:cNvSpPr>
+          <p:nvPr>
+            <p:ph type="title"/>
+          </p:nvPr>
+        </p:nvSpPr>
+        <p:spPr>
+          <a:xfrm>
+            <a:off x="581192" y="702156"/>
+            <a:ext cx="11029616" cy="770183"/>
+          </a:xfrm>
+        </p:spPr>
+        <p:txBody>
+          <a:bodyPr>
+            <a:normAutofit/>
+          </a:bodyPr>
+          <a:lstStyle/>
+          <a:p>
+            <a:r>
+              <a:rPr lang="fr-FR" sz="4400" dirty="0"/>
+              <a:t>Conclusion</a:t>
+            </a:r>
+          </a:p>
+        </p:txBody>
+      </p:sp>
+      <p:sp>
+        <p:nvSpPr>
+          <p:cNvPr id="3" name="Espace réservé du contenu 2">
+            <a:extLst>
+              <a:ext uri="{FF2B5EF4-FFF2-40B4-BE49-F238E27FC236}">
+                <a16:creationId xmlns:a16="http://schemas.microsoft.com/office/drawing/2014/main" id="{CB26CDDF-A9D4-09A4-C16E-141C0FA1BBC0}"/>
+              </a:ext>
+            </a:extLst>
+          </p:cNvPr>
+          <p:cNvSpPr>
+            <a:spLocks noGrp="1"/>
+          </p:cNvSpPr>
+          <p:nvPr>
+            <p:ph idx="1"/>
+          </p:nvPr>
+        </p:nvSpPr>
+        <p:spPr>
+          <a:xfrm>
+            <a:off x="581192" y="1611757"/>
+            <a:ext cx="11029615" cy="3634486"/>
+          </a:xfrm>
+        </p:spPr>
+        <p:txBody>
+          <a:bodyPr/>
+          <a:lstStyle/>
+          <a:p>
+            <a:pPr algn="just">
+              <a:buFont typeface="Wingdings" panose="05000000000000000000" pitchFamily="2" charset="2"/>
+              <a:buChar char="q"/>
+            </a:pPr>
+            <a:r>
+              <a:rPr lang="fr-FR" sz="2800" dirty="0">
+                <a:solidFill>
+                  <a:schemeClr val="tx1">
+                    <a:lumMod val="95000"/>
+                    <a:lumOff val="5000"/>
+                  </a:schemeClr>
+                </a:solidFill>
+              </a:rPr>
+              <a:t>Agri-Veille offre une solution complète de veille agricole, alliant robustesse technique et convivialité.</a:t>
+            </a:r>
+          </a:p>
+          <a:p>
+            <a:pPr algn="just">
+              <a:buFont typeface="Wingdings" panose="05000000000000000000" pitchFamily="2" charset="2"/>
+              <a:buChar char="q"/>
+            </a:pPr>
+            <a:r>
+              <a:rPr lang="fr-FR" sz="2800" dirty="0">
+                <a:solidFill>
+                  <a:schemeClr val="tx1">
+                    <a:lumMod val="95000"/>
+                    <a:lumOff val="5000"/>
+                  </a:schemeClr>
+                </a:solidFill>
+              </a:rPr>
+              <a:t>Perspectives d'avenir : Intégration de fonctionnalités avancées, expansion vers de nouveaux marchés.</a:t>
+            </a:r>
+          </a:p>
+          <a:p>
+            <a:endParaRPr lang="fr-FR" dirty="0"/>
+          </a:p>
+        </p:txBody>
+      </p:sp>
+      <p:sp>
+        <p:nvSpPr>
+          <p:cNvPr id="5" name="ZoneTexte 4">
+            <a:extLst>
+              <a:ext uri="{FF2B5EF4-FFF2-40B4-BE49-F238E27FC236}">
+                <a16:creationId xmlns:a16="http://schemas.microsoft.com/office/drawing/2014/main" id="{9D745652-3E8A-6928-38E7-17F2C6F3ED5E}"/>
+              </a:ext>
+            </a:extLst>
+          </p:cNvPr>
+          <p:cNvSpPr txBox="1"/>
+          <p:nvPr/>
+        </p:nvSpPr>
+        <p:spPr>
+          <a:xfrm>
+            <a:off x="2805193" y="5129939"/>
+            <a:ext cx="6261315" cy="1107996"/>
+          </a:xfrm>
+          <a:prstGeom prst="rect">
+            <a:avLst/>
+          </a:prstGeom>
+          <a:noFill/>
+        </p:spPr>
+        <p:txBody>
+          <a:bodyPr wrap="square" rtlCol="0">
+            <a:spAutoFit/>
+          </a:bodyPr>
+          <a:lstStyle/>
+          <a:p>
+            <a:pPr algn="ctr"/>
+            <a:r>
+              <a:rPr lang="fr-FR" sz="2400" dirty="0"/>
+              <a:t>Retrouver l’application et l’ensemble du projet sur le repository GitHub suivant:</a:t>
+            </a:r>
+          </a:p>
+          <a:p>
+            <a:r>
+              <a:rPr lang="fr-FR" u="sng" dirty="0">
+                <a:solidFill>
+                  <a:schemeClr val="accent1"/>
+                </a:solidFill>
+              </a:rPr>
+              <a:t>https://github.com/Saynbemorinbewang2/Vst_Apps_2024.git</a:t>
+            </a:r>
+          </a:p>
+        </p:txBody>
+      </p:sp>
+      <p:sp>
+        <p:nvSpPr>
+          <p:cNvPr id="6" name="Espace réservé du pied de page 5">
+            <a:extLst>
+              <a:ext uri="{FF2B5EF4-FFF2-40B4-BE49-F238E27FC236}">
+                <a16:creationId xmlns:a16="http://schemas.microsoft.com/office/drawing/2014/main" id="{765512A0-2264-A2D5-38AB-20FB69203BBF}"/>
+              </a:ext>
+            </a:extLst>
+          </p:cNvPr>
+          <p:cNvSpPr>
+            <a:spLocks noGrp="1"/>
+          </p:cNvSpPr>
+          <p:nvPr>
+            <p:ph type="ftr" sz="quarter" idx="11"/>
+          </p:nvPr>
+        </p:nvSpPr>
+        <p:spPr/>
+        <p:txBody>
+          <a:bodyPr/>
+          <a:lstStyle/>
+          <a:p>
+            <a:pPr rtl="0"/>
+            <a:r>
+              <a:rPr lang="en-US" dirty="0"/>
+              <a:t>Groupe 2</a:t>
+            </a:r>
+          </a:p>
+        </p:txBody>
+      </p:sp>
+      <p:sp>
+        <p:nvSpPr>
+          <p:cNvPr id="9" name="Espace réservé du numéro de diapositive 8">
+            <a:extLst>
+              <a:ext uri="{FF2B5EF4-FFF2-40B4-BE49-F238E27FC236}">
+                <a16:creationId xmlns:a16="http://schemas.microsoft.com/office/drawing/2014/main" id="{6DDF2771-0BD6-DF1B-B09E-9A2123B944C2}"/>
+              </a:ext>
+            </a:extLst>
+          </p:cNvPr>
+          <p:cNvSpPr>
+            <a:spLocks noGrp="1"/>
+          </p:cNvSpPr>
+          <p:nvPr>
+            <p:ph type="sldNum" sz="quarter" idx="12"/>
+          </p:nvPr>
+        </p:nvSpPr>
+        <p:spPr/>
+        <p:txBody>
+          <a:bodyPr/>
+          <a:lstStyle/>
+          <a:p>
+            <a:pPr rtl="0"/>
+            <a:fld id="{3A98EE3D-8CD1-4C3F-BD1C-C98C9596463C}" type="slidenum">
+              <a:rPr lang="en-US" smtClean="0"/>
+              <a:t>14</a:t>
+            </a:fld>
+            <a:endParaRPr lang="en-US" dirty="0"/>
+          </a:p>
+        </p:txBody>
+      </p:sp>
+    </p:spTree>
+    <p:extLst>
+      <p:ext uri="{BB962C8B-B14F-4D97-AF65-F5344CB8AC3E}">
+        <p14:creationId xmlns:p14="http://schemas.microsoft.com/office/powerpoint/2010/main" val="1962157946"/>
+      </p:ext>
+    </p:extLst>
+  </p:cSld>
+  <p:clrMapOvr>
+    <a:masterClrMapping/>
+  </p:clrMapOvr>
+</p:sld>
+</file>
+
+<file path=ppt/slides/slide15.xml><?xml version="1.0" encoding="utf-8"?>
+<p:sld xmlns:a="http://schemas.openxmlformats.org/drawingml/2006/main" xmlns:r="http://schemas.openxmlformats.org/officeDocument/2006/relationships" xmlns:p="http://schemas.openxmlformats.org/presentationml/2006/main">
+  <p:cSld>
+    <p:spTree>
+      <p:nvGrpSpPr>
+        <p:cNvPr id="1" name=""/>
+        <p:cNvGrpSpPr/>
+        <p:nvPr/>
+      </p:nvGrpSpPr>
+      <p:grpSpPr>
+        <a:xfrm>
+          <a:off x="0" y="0"/>
+          <a:ext cx="0" cy="0"/>
+          <a:chOff x="0" y="0"/>
+          <a:chExt cx="0" cy="0"/>
+        </a:xfrm>
+      </p:grpSpPr>
       <p:pic>
         <p:nvPicPr>
           <p:cNvPr id="7" name="Espace réservé du contenu 6">
@@ -6606,7 +6815,7 @@
             <a:pPr rtl="0"/>
             <a:fld id="{3A98EE3D-8CD1-4C3F-BD1C-C98C9596463C}" type="slidenum">
               <a:rPr lang="en-US" smtClean="0"/>
-              <a:t>14</a:t>
+              <a:t>15</a:t>
             </a:fld>
             <a:endParaRPr lang="en-US" dirty="0"/>
           </a:p>
@@ -6622,13 +6831,13 @@
   <p:clrMapOvr>
     <a:masterClrMapping/>
   </p:clrMapOvr>
-  <mc:AlternateContent xmlns:mc="http://schemas.openxmlformats.org/markup-compatibility/2006">
-    <mc:Choice xmlns:p14="http://schemas.microsoft.com/office/powerpoint/2010/main" Requires="p14">
+  <mc:AlternateContent xmlns:mc="http://schemas.openxmlformats.org/markup-compatibility/2006" xmlns:p14="http://schemas.microsoft.com/office/powerpoint/2010/main">
+    <mc:Choice Requires="p14">
       <p:transition spd="slow" p14:dur="1300">
         <p14:pan dir="u"/>
       </p:transition>
     </mc:Choice>
-    <mc:Fallback>
+    <mc:Fallback xmlns="">
       <p:transition spd="slow">
         <p:fade/>
       </p:transition>
@@ -6638,6 +6847,263 @@
 </file>
 
 <file path=ppt/slides/slide2.xml><?xml version="1.0" encoding="utf-8"?>
+<p:sld xmlns:a="http://schemas.openxmlformats.org/drawingml/2006/main" xmlns:r="http://schemas.openxmlformats.org/officeDocument/2006/relationships" xmlns:p="http://schemas.openxmlformats.org/presentationml/2006/main">
+  <p:cSld>
+    <p:spTree>
+      <p:nvGrpSpPr>
+        <p:cNvPr id="1" name=""/>
+        <p:cNvGrpSpPr/>
+        <p:nvPr/>
+      </p:nvGrpSpPr>
+      <p:grpSpPr>
+        <a:xfrm>
+          <a:off x="0" y="0"/>
+          <a:ext cx="0" cy="0"/>
+          <a:chOff x="0" y="0"/>
+          <a:chExt cx="0" cy="0"/>
+        </a:xfrm>
+      </p:grpSpPr>
+      <p:sp>
+        <p:nvSpPr>
+          <p:cNvPr id="2" name="Titre 1">
+            <a:extLst>
+              <a:ext uri="{FF2B5EF4-FFF2-40B4-BE49-F238E27FC236}">
+                <a16:creationId xmlns:a16="http://schemas.microsoft.com/office/drawing/2014/main" id="{D7DF5410-C2D1-EEED-56CA-B69A2921B544}"/>
+              </a:ext>
+            </a:extLst>
+          </p:cNvPr>
+          <p:cNvSpPr>
+            <a:spLocks noGrp="1"/>
+          </p:cNvSpPr>
+          <p:nvPr>
+            <p:ph type="title"/>
+          </p:nvPr>
+        </p:nvSpPr>
+        <p:spPr>
+          <a:xfrm>
+            <a:off x="581192" y="702156"/>
+            <a:ext cx="11029616" cy="475715"/>
+          </a:xfrm>
+        </p:spPr>
+        <p:txBody>
+          <a:bodyPr>
+            <a:normAutofit fontScale="90000"/>
+          </a:bodyPr>
+          <a:lstStyle/>
+          <a:p>
+            <a:r>
+              <a:rPr lang="fr-FR" dirty="0"/>
+              <a:t>Plan</a:t>
+            </a:r>
+          </a:p>
+        </p:txBody>
+      </p:sp>
+      <p:sp>
+        <p:nvSpPr>
+          <p:cNvPr id="4" name="Espace réservé du pied de page 3">
+            <a:extLst>
+              <a:ext uri="{FF2B5EF4-FFF2-40B4-BE49-F238E27FC236}">
+                <a16:creationId xmlns:a16="http://schemas.microsoft.com/office/drawing/2014/main" id="{61B21D1B-2850-229B-24AE-87DE07CD387E}"/>
+              </a:ext>
+            </a:extLst>
+          </p:cNvPr>
+          <p:cNvSpPr>
+            <a:spLocks noGrp="1"/>
+          </p:cNvSpPr>
+          <p:nvPr>
+            <p:ph type="ftr" sz="quarter" idx="11"/>
+          </p:nvPr>
+        </p:nvSpPr>
+        <p:spPr/>
+        <p:txBody>
+          <a:bodyPr/>
+          <a:lstStyle/>
+          <a:p>
+            <a:pPr rtl="0"/>
+            <a:r>
+              <a:rPr lang="en-US"/>
+              <a:t>Groupe 2</a:t>
+            </a:r>
+            <a:endParaRPr lang="en-US" dirty="0"/>
+          </a:p>
+        </p:txBody>
+      </p:sp>
+      <p:sp>
+        <p:nvSpPr>
+          <p:cNvPr id="5" name="Espace réservé du numéro de diapositive 4">
+            <a:extLst>
+              <a:ext uri="{FF2B5EF4-FFF2-40B4-BE49-F238E27FC236}">
+                <a16:creationId xmlns:a16="http://schemas.microsoft.com/office/drawing/2014/main" id="{889991FD-2171-7CE5-67E4-3EF7DFE48C60}"/>
+              </a:ext>
+            </a:extLst>
+          </p:cNvPr>
+          <p:cNvSpPr>
+            <a:spLocks noGrp="1"/>
+          </p:cNvSpPr>
+          <p:nvPr>
+            <p:ph type="sldNum" sz="quarter" idx="12"/>
+          </p:nvPr>
+        </p:nvSpPr>
+        <p:spPr/>
+        <p:txBody>
+          <a:bodyPr/>
+          <a:lstStyle/>
+          <a:p>
+            <a:pPr rtl="0"/>
+            <a:fld id="{3A98EE3D-8CD1-4C3F-BD1C-C98C9596463C}" type="slidenum">
+              <a:rPr lang="en-US" smtClean="0"/>
+              <a:t>2</a:t>
+            </a:fld>
+            <a:endParaRPr lang="en-US" dirty="0"/>
+          </a:p>
+        </p:txBody>
+      </p:sp>
+      <p:sp>
+        <p:nvSpPr>
+          <p:cNvPr id="8" name="Espace réservé du contenu 7">
+            <a:extLst>
+              <a:ext uri="{FF2B5EF4-FFF2-40B4-BE49-F238E27FC236}">
+                <a16:creationId xmlns:a16="http://schemas.microsoft.com/office/drawing/2014/main" id="{7B68E72F-60CB-23AB-BCD2-4ED221AAC61F}"/>
+              </a:ext>
+            </a:extLst>
+          </p:cNvPr>
+          <p:cNvSpPr>
+            <a:spLocks noGrp="1"/>
+          </p:cNvSpPr>
+          <p:nvPr>
+            <p:ph idx="1"/>
+          </p:nvPr>
+        </p:nvSpPr>
+        <p:spPr>
+          <a:xfrm>
+            <a:off x="581192" y="1379349"/>
+            <a:ext cx="11029615" cy="4596001"/>
+          </a:xfrm>
+        </p:spPr>
+        <p:txBody>
+          <a:bodyPr>
+            <a:normAutofit fontScale="92500" lnSpcReduction="20000"/>
+          </a:bodyPr>
+          <a:lstStyle/>
+          <a:p>
+            <a:pPr marL="342900" indent="-342900">
+              <a:buFont typeface="+mj-lt"/>
+              <a:buAutoNum type="arabicPeriod"/>
+            </a:pPr>
+            <a:r>
+              <a:rPr lang="fr-FR" sz="2400" dirty="0"/>
+              <a:t>Introduction</a:t>
+            </a:r>
+          </a:p>
+          <a:p>
+            <a:pPr marL="342900" indent="-342900">
+              <a:buFont typeface="+mj-lt"/>
+              <a:buAutoNum type="arabicPeriod"/>
+            </a:pPr>
+            <a:r>
+              <a:rPr lang="fr-FR" sz="2400" dirty="0"/>
+              <a:t>Ciblage</a:t>
+            </a:r>
+          </a:p>
+          <a:p>
+            <a:pPr marL="342900" indent="-342900">
+              <a:buFont typeface="+mj-lt"/>
+              <a:buAutoNum type="arabicPeriod"/>
+            </a:pPr>
+            <a:r>
+              <a:rPr lang="fr-FR" sz="2400" dirty="0"/>
+              <a:t>Recherche</a:t>
+            </a:r>
+          </a:p>
+          <a:p>
+            <a:pPr marL="342900" indent="-342900">
+              <a:buFont typeface="+mj-lt"/>
+              <a:buAutoNum type="arabicPeriod"/>
+            </a:pPr>
+            <a:r>
+              <a:rPr lang="fr-FR" sz="2400" dirty="0"/>
+              <a:t>Analyse</a:t>
+            </a:r>
+          </a:p>
+          <a:p>
+            <a:pPr marL="342900" indent="-342900">
+              <a:buFont typeface="+mj-lt"/>
+              <a:buAutoNum type="arabicPeriod"/>
+            </a:pPr>
+            <a:r>
+              <a:rPr lang="fr-FR" sz="2400" dirty="0"/>
+              <a:t>Diffusion</a:t>
+            </a:r>
+          </a:p>
+          <a:p>
+            <a:pPr marL="342900" indent="-342900">
+              <a:buFont typeface="+mj-lt"/>
+              <a:buAutoNum type="arabicPeriod"/>
+            </a:pPr>
+            <a:r>
+              <a:rPr lang="fr-FR" sz="2400" dirty="0"/>
+              <a:t>Architecture de l’application</a:t>
+            </a:r>
+          </a:p>
+          <a:p>
+            <a:pPr marL="342900" indent="-342900">
+              <a:buFont typeface="+mj-lt"/>
+              <a:buAutoNum type="arabicPeriod"/>
+            </a:pPr>
+            <a:r>
+              <a:rPr lang="fr-FR" sz="2400" dirty="0"/>
+              <a:t>Technologie Utilisée</a:t>
+            </a:r>
+          </a:p>
+          <a:p>
+            <a:pPr marL="342900" indent="-342900">
+              <a:buFont typeface="+mj-lt"/>
+              <a:buAutoNum type="arabicPeriod"/>
+            </a:pPr>
+            <a:r>
+              <a:rPr lang="fr-FR" sz="2400" dirty="0"/>
+              <a:t>Diagramme de UML de l’application</a:t>
+            </a:r>
+          </a:p>
+          <a:p>
+            <a:pPr marL="342900" indent="-342900">
+              <a:buFont typeface="+mj-lt"/>
+              <a:buAutoNum type="arabicPeriod"/>
+            </a:pPr>
+            <a:r>
+              <a:rPr lang="fr-FR" sz="2400" dirty="0"/>
+              <a:t>Présentation de l’application</a:t>
+            </a:r>
+          </a:p>
+          <a:p>
+            <a:pPr marL="342900" indent="-342900">
+              <a:buFont typeface="+mj-lt"/>
+              <a:buAutoNum type="arabicPeriod"/>
+            </a:pPr>
+            <a:r>
+              <a:rPr lang="fr-FR" sz="2400" dirty="0"/>
+              <a:t>Conclusion</a:t>
+            </a:r>
+          </a:p>
+          <a:p>
+            <a:endParaRPr lang="fr-FR" dirty="0"/>
+          </a:p>
+        </p:txBody>
+      </p:sp>
+    </p:spTree>
+    <p:extLst>
+      <p:ext uri="{BB962C8B-B14F-4D97-AF65-F5344CB8AC3E}">
+        <p14:creationId xmlns:p14="http://schemas.microsoft.com/office/powerpoint/2010/main" val="357159228"/>
+      </p:ext>
+    </p:extLst>
+  </p:cSld>
+  <p:clrMapOvr>
+    <a:masterClrMapping/>
+  </p:clrMapOvr>
+</p:sld>
+</file>
+
+<file path=ppt/slides/slide3.xml><?xml version="1.0" encoding="utf-8"?>
 <p:sld xmlns:a="http://schemas.openxmlformats.org/drawingml/2006/main" xmlns:r="http://schemas.openxmlformats.org/officeDocument/2006/relationships" xmlns:p="http://schemas.openxmlformats.org/presentationml/2006/main">
   <p:cSld>
     <p:spTree>
@@ -6930,7 +7396,7 @@
             <a:pPr rtl="0"/>
             <a:fld id="{3A98EE3D-8CD1-4C3F-BD1C-C98C9596463C}" type="slidenum">
               <a:rPr lang="en-US" smtClean="0"/>
-              <a:t>2</a:t>
+              <a:t>3</a:t>
             </a:fld>
             <a:endParaRPr lang="en-US" dirty="0"/>
           </a:p>
@@ -6946,13 +7412,13 @@
   <p:clrMapOvr>
     <a:masterClrMapping/>
   </p:clrMapOvr>
-  <mc:AlternateContent xmlns:mc="http://schemas.openxmlformats.org/markup-compatibility/2006">
-    <mc:Choice xmlns:p14="http://schemas.microsoft.com/office/powerpoint/2010/main" Requires="p14">
+  <mc:AlternateContent xmlns:mc="http://schemas.openxmlformats.org/markup-compatibility/2006" xmlns:p14="http://schemas.microsoft.com/office/powerpoint/2010/main">
+    <mc:Choice Requires="p14">
       <p:transition spd="slow" p14:dur="800">
         <p14:flythrough/>
       </p:transition>
     </mc:Choice>
-    <mc:Fallback>
+    <mc:Fallback xmlns="">
       <p:transition spd="slow">
         <p:fade/>
       </p:transition>
@@ -6961,7 +7427,7 @@
 </p:sld>
 </file>
 
-<file path=ppt/slides/slide3.xml><?xml version="1.0" encoding="utf-8"?>
+<file path=ppt/slides/slide4.xml><?xml version="1.0" encoding="utf-8"?>
 <p:sld xmlns:a="http://schemas.openxmlformats.org/drawingml/2006/main" xmlns:r="http://schemas.openxmlformats.org/officeDocument/2006/relationships" xmlns:p="http://schemas.openxmlformats.org/presentationml/2006/main">
   <p:cSld>
     <p:spTree>
@@ -7216,7 +7682,7 @@
             <a:pPr rtl="0"/>
             <a:fld id="{3A98EE3D-8CD1-4C3F-BD1C-C98C9596463C}" type="slidenum">
               <a:rPr lang="en-US" smtClean="0"/>
-              <a:t>3</a:t>
+              <a:t>4</a:t>
             </a:fld>
             <a:endParaRPr lang="en-US" dirty="0"/>
           </a:p>
@@ -7235,7 +7701,7 @@
 </p:sld>
 </file>
 
-<file path=ppt/slides/slide4.xml><?xml version="1.0" encoding="utf-8"?>
+<file path=ppt/slides/slide5.xml><?xml version="1.0" encoding="utf-8"?>
 <p:sld xmlns:a="http://schemas.openxmlformats.org/drawingml/2006/main" xmlns:r="http://schemas.openxmlformats.org/officeDocument/2006/relationships" xmlns:p="http://schemas.openxmlformats.org/presentationml/2006/main">
   <p:cSld>
     <p:spTree>
@@ -7740,7 +8206,7 @@
             <a:pPr rtl="0"/>
             <a:fld id="{3A98EE3D-8CD1-4C3F-BD1C-C98C9596463C}" type="slidenum">
               <a:rPr lang="en-US" smtClean="0"/>
-              <a:t>4</a:t>
+              <a:t>5</a:t>
             </a:fld>
             <a:endParaRPr lang="en-US" dirty="0"/>
           </a:p>
@@ -7756,409 +8222,18 @@
   <p:clrMapOvr>
     <a:masterClrMapping/>
   </p:clrMapOvr>
-  <mc:AlternateContent xmlns:mc="http://schemas.openxmlformats.org/markup-compatibility/2006">
-    <mc:Choice xmlns:p14="http://schemas.microsoft.com/office/powerpoint/2010/main" Requires="p14">
+  <mc:AlternateContent xmlns:mc="http://schemas.openxmlformats.org/markup-compatibility/2006" xmlns:p14="http://schemas.microsoft.com/office/powerpoint/2010/main">
+    <mc:Choice Requires="p14">
       <p:transition spd="slow" p14:dur="1600">
         <p14:gallery dir="l"/>
       </p:transition>
     </mc:Choice>
-    <mc:Fallback>
+    <mc:Fallback xmlns="">
       <p:transition spd="slow">
         <p:fade/>
       </p:transition>
     </mc:Fallback>
   </mc:AlternateContent>
-</p:sld>
-</file>
-
-<file path=ppt/slides/slide5.xml><?xml version="1.0" encoding="utf-8"?>
-<p:sld xmlns:a="http://schemas.openxmlformats.org/drawingml/2006/main" xmlns:r="http://schemas.openxmlformats.org/officeDocument/2006/relationships" xmlns:p="http://schemas.openxmlformats.org/presentationml/2006/main">
-  <p:cSld>
-    <p:spTree>
-      <p:nvGrpSpPr>
-        <p:cNvPr id="1" name=""/>
-        <p:cNvGrpSpPr/>
-        <p:nvPr/>
-      </p:nvGrpSpPr>
-      <p:grpSpPr>
-        <a:xfrm>
-          <a:off x="0" y="0"/>
-          <a:ext cx="0" cy="0"/>
-          <a:chOff x="0" y="0"/>
-          <a:chExt cx="0" cy="0"/>
-        </a:xfrm>
-      </p:grpSpPr>
-      <p:pic>
-        <p:nvPicPr>
-          <p:cNvPr id="9" name="Image 8">
-            <a:extLst>
-              <a:ext uri="{FF2B5EF4-FFF2-40B4-BE49-F238E27FC236}">
-                <a16:creationId xmlns:a16="http://schemas.microsoft.com/office/drawing/2014/main" id="{D6C7685E-5181-6321-887E-00974D9E86D4}"/>
-              </a:ext>
-            </a:extLst>
-          </p:cNvPr>
-          <p:cNvPicPr>
-            <a:picLocks noChangeAspect="1"/>
-          </p:cNvPicPr>
-          <p:nvPr/>
-        </p:nvPicPr>
-        <p:blipFill>
-          <a:blip r:embed="rId2">
-            <a:extLst>
-              <a:ext uri="{28A0092B-C50C-407E-A947-70E740481C1C}">
-                <a14:useLocalDpi xmlns:a14="http://schemas.microsoft.com/office/drawing/2010/main" val="0"/>
-              </a:ext>
-            </a:extLst>
-          </a:blip>
-          <a:stretch>
-            <a:fillRect/>
-          </a:stretch>
-        </p:blipFill>
-        <p:spPr>
-          <a:xfrm>
-            <a:off x="8664575" y="1256250"/>
-            <a:ext cx="3334988" cy="2217767"/>
-          </a:xfrm>
-          <a:prstGeom prst="rect">
-            <a:avLst/>
-          </a:prstGeom>
-        </p:spPr>
-      </p:pic>
-      <p:sp>
-        <p:nvSpPr>
-          <p:cNvPr id="2" name="Titre 1">
-            <a:extLst>
-              <a:ext uri="{FF2B5EF4-FFF2-40B4-BE49-F238E27FC236}">
-                <a16:creationId xmlns:a16="http://schemas.microsoft.com/office/drawing/2014/main" id="{CEE61FAD-F7D8-7EFE-12F4-D1AD2E6FDDB8}"/>
-              </a:ext>
-            </a:extLst>
-          </p:cNvPr>
-          <p:cNvSpPr>
-            <a:spLocks noGrp="1"/>
-          </p:cNvSpPr>
-          <p:nvPr>
-            <p:ph type="title"/>
-          </p:nvPr>
-        </p:nvSpPr>
-        <p:spPr>
-          <a:xfrm>
-            <a:off x="581192" y="702156"/>
-            <a:ext cx="11029616" cy="878671"/>
-          </a:xfrm>
-        </p:spPr>
-        <p:txBody>
-          <a:bodyPr>
-            <a:noAutofit/>
-          </a:bodyPr>
-          <a:lstStyle/>
-          <a:p>
-            <a:r>
-              <a:rPr lang="fr-FR" sz="4400" dirty="0"/>
-              <a:t>Analyse</a:t>
-            </a:r>
-          </a:p>
-        </p:txBody>
-      </p:sp>
-      <p:sp>
-        <p:nvSpPr>
-          <p:cNvPr id="3" name="Espace réservé du contenu 2">
-            <a:extLst>
-              <a:ext uri="{FF2B5EF4-FFF2-40B4-BE49-F238E27FC236}">
-                <a16:creationId xmlns:a16="http://schemas.microsoft.com/office/drawing/2014/main" id="{C8942728-87B6-14CE-2896-70B000AD41F2}"/>
-              </a:ext>
-            </a:extLst>
-          </p:cNvPr>
-          <p:cNvSpPr>
-            <a:spLocks noGrp="1"/>
-          </p:cNvSpPr>
-          <p:nvPr>
-            <p:ph idx="1"/>
-          </p:nvPr>
-        </p:nvSpPr>
-        <p:spPr>
-          <a:xfrm>
-            <a:off x="581192" y="1704814"/>
-            <a:ext cx="11029615" cy="4270536"/>
-          </a:xfrm>
-        </p:spPr>
-        <p:txBody>
-          <a:bodyPr>
-            <a:normAutofit lnSpcReduction="10000"/>
-          </a:bodyPr>
-          <a:lstStyle/>
-          <a:p>
-            <a:pPr marL="0" indent="0" algn="l">
-              <a:buNone/>
-            </a:pPr>
-            <a:r>
-              <a:rPr lang="fr-FR" sz="3200" b="1" dirty="0">
-                <a:solidFill>
-                  <a:schemeClr val="accent1"/>
-                </a:solidFill>
-              </a:rPr>
-              <a:t>Évaluation des Sources et Fiabilité des Informations</a:t>
-            </a:r>
-          </a:p>
-          <a:p>
-            <a:pPr algn="l">
-              <a:buFont typeface="Wingdings" panose="05000000000000000000" pitchFamily="2" charset="2"/>
-              <a:buChar char="q"/>
-            </a:pPr>
-            <a:r>
-              <a:rPr lang="fr-FR" sz="2400" dirty="0">
-                <a:solidFill>
-                  <a:schemeClr val="tx1"/>
-                </a:solidFill>
-              </a:rPr>
-              <a:t>Analyse basée sur des critères stricts : Fiabilité, Pertinence et Qualité.</a:t>
-            </a:r>
-          </a:p>
-          <a:p>
-            <a:pPr algn="l">
-              <a:buFont typeface="Wingdings" panose="05000000000000000000" pitchFamily="2" charset="2"/>
-              <a:buChar char="q"/>
-            </a:pPr>
-            <a:r>
-              <a:rPr lang="fr-FR" sz="2400" dirty="0">
-                <a:solidFill>
-                  <a:schemeClr val="tx1"/>
-                </a:solidFill>
-              </a:rPr>
-              <a:t>Examen détaillé de trois sources principales :</a:t>
-            </a:r>
-          </a:p>
-          <a:p>
-            <a:pPr marL="800100" lvl="1" indent="-342900" algn="l">
-              <a:buFont typeface="Wingdings" panose="05000000000000000000" pitchFamily="2" charset="2"/>
-              <a:buChar char="§"/>
-            </a:pPr>
-            <a:r>
-              <a:rPr lang="fr-FR" sz="2000" dirty="0">
-                <a:solidFill>
-                  <a:schemeClr val="accent1"/>
-                </a:solidFill>
-              </a:rPr>
-              <a:t>Afrique-Agriculture (</a:t>
-            </a:r>
-            <a:r>
-              <a:rPr lang="fr-FR" sz="2000" dirty="0">
-                <a:solidFill>
-                  <a:schemeClr val="accent1"/>
-                </a:solidFill>
-                <a:hlinkClick r:id="rId3">
-                  <a:extLst>
-                    <a:ext uri="{A12FA001-AC4F-418D-AE19-62706E023703}">
-                      <ahyp:hlinkClr xmlns:ahyp="http://schemas.microsoft.com/office/drawing/2018/hyperlinkcolor" val="tx"/>
-                    </a:ext>
-                  </a:extLst>
-                </a:hlinkClick>
-              </a:rPr>
-              <a:t>www.afrique-agriculture.org</a:t>
-            </a:r>
-            <a:r>
-              <a:rPr lang="fr-FR" sz="2000" dirty="0">
-                <a:solidFill>
-                  <a:schemeClr val="accent1"/>
-                </a:solidFill>
-              </a:rPr>
-              <a:t>)</a:t>
-            </a:r>
-          </a:p>
-          <a:p>
-            <a:pPr marL="800100" lvl="1" indent="-342900" algn="l">
-              <a:buFont typeface="Wingdings" panose="05000000000000000000" pitchFamily="2" charset="2"/>
-              <a:buChar char="§"/>
-            </a:pPr>
-            <a:r>
-              <a:rPr lang="fr-FR" sz="2000" dirty="0">
-                <a:solidFill>
-                  <a:schemeClr val="accent1"/>
-                </a:solidFill>
-              </a:rPr>
-              <a:t>La page agriculture d’Afrique la tribune (</a:t>
-            </a:r>
-            <a:r>
-              <a:rPr lang="fr-FR" sz="2000" dirty="0">
-                <a:solidFill>
-                  <a:schemeClr val="accent1"/>
-                </a:solidFill>
-                <a:hlinkClick r:id="rId4">
-                  <a:extLst>
-                    <a:ext uri="{A12FA001-AC4F-418D-AE19-62706E023703}">
-                      <ahyp:hlinkClr xmlns:ahyp="http://schemas.microsoft.com/office/drawing/2018/hyperlinkcolor" val="tx"/>
-                    </a:ext>
-                  </a:extLst>
-                </a:hlinkClick>
-              </a:rPr>
-              <a:t>www.afrique.latribune.fr/entreprises/agriculture</a:t>
-            </a:r>
-            <a:r>
-              <a:rPr lang="fr-FR" sz="2000" dirty="0">
-                <a:solidFill>
-                  <a:schemeClr val="accent1"/>
-                </a:solidFill>
-              </a:rPr>
-              <a:t>)</a:t>
-            </a:r>
-          </a:p>
-          <a:p>
-            <a:pPr marL="800100" lvl="1" indent="-342900" algn="l">
-              <a:buFont typeface="Wingdings" panose="05000000000000000000" pitchFamily="2" charset="2"/>
-              <a:buChar char="§"/>
-            </a:pPr>
-            <a:r>
-              <a:rPr lang="fr-FR" sz="2000" dirty="0">
-                <a:solidFill>
-                  <a:schemeClr val="accent1"/>
-                </a:solidFill>
-              </a:rPr>
-              <a:t>La page agriculture de </a:t>
-            </a:r>
-            <a:r>
-              <a:rPr lang="fr-FR" sz="2000" dirty="0" err="1">
-                <a:solidFill>
-                  <a:schemeClr val="accent1"/>
-                </a:solidFill>
-              </a:rPr>
-              <a:t>scidev</a:t>
-            </a:r>
-            <a:r>
-              <a:rPr lang="fr-FR" sz="2000" dirty="0">
-                <a:solidFill>
-                  <a:schemeClr val="accent1"/>
-                </a:solidFill>
-              </a:rPr>
-              <a:t> (</a:t>
-            </a:r>
-            <a:r>
-              <a:rPr lang="fr-FR" sz="2000" dirty="0">
-                <a:solidFill>
-                  <a:schemeClr val="accent1"/>
-                </a:solidFill>
-                <a:hlinkClick r:id="rId5">
-                  <a:extLst>
-                    <a:ext uri="{A12FA001-AC4F-418D-AE19-62706E023703}">
-                      <ahyp:hlinkClr xmlns:ahyp="http://schemas.microsoft.com/office/drawing/2018/hyperlinkcolor" val="tx"/>
-                    </a:ext>
-                  </a:extLst>
-                </a:hlinkClick>
-              </a:rPr>
-              <a:t>www.scidev.net/afrique-sub-saharienne/agriculture</a:t>
-            </a:r>
-            <a:r>
-              <a:rPr lang="fr-FR" sz="2000" dirty="0">
-                <a:solidFill>
-                  <a:schemeClr val="accent1"/>
-                </a:solidFill>
-              </a:rPr>
-              <a:t>)</a:t>
-            </a:r>
-          </a:p>
-          <a:p>
-            <a:pPr algn="l">
-              <a:buFont typeface="Wingdings" panose="05000000000000000000" pitchFamily="2" charset="2"/>
-              <a:buChar char="q"/>
-            </a:pPr>
-            <a:r>
-              <a:rPr lang="fr-FR" sz="2400" dirty="0">
-                <a:solidFill>
-                  <a:schemeClr val="tx1"/>
-                </a:solidFill>
-              </a:rPr>
-              <a:t>Critères d'évaluation : </a:t>
-            </a:r>
-            <a:r>
-              <a:rPr lang="fr-FR" sz="2400" b="1" dirty="0">
-                <a:solidFill>
-                  <a:schemeClr val="tx1"/>
-                </a:solidFill>
-              </a:rPr>
-              <a:t>Auteur, Publication et diffusion, Objectif, Date, Nature du document, Transmission de l'information, Vérification des informations, Domaine expertise, Crédibilité, Mise à jour régulière, Qualité du contenu</a:t>
-            </a:r>
-            <a:r>
-              <a:rPr lang="fr-FR" sz="2400" dirty="0">
-                <a:solidFill>
-                  <a:schemeClr val="tx1"/>
-                </a:solidFill>
-              </a:rPr>
-              <a:t>.</a:t>
-            </a:r>
-          </a:p>
-          <a:p>
-            <a:endParaRPr lang="fr-FR" dirty="0"/>
-          </a:p>
-        </p:txBody>
-      </p:sp>
-      <p:sp>
-        <p:nvSpPr>
-          <p:cNvPr id="10" name="Espace réservé du pied de page 9">
-            <a:extLst>
-              <a:ext uri="{FF2B5EF4-FFF2-40B4-BE49-F238E27FC236}">
-                <a16:creationId xmlns:a16="http://schemas.microsoft.com/office/drawing/2014/main" id="{C5FB9840-59C4-B070-F34B-20AEC56DA5EE}"/>
-              </a:ext>
-            </a:extLst>
-          </p:cNvPr>
-          <p:cNvSpPr>
-            <a:spLocks noGrp="1"/>
-          </p:cNvSpPr>
-          <p:nvPr>
-            <p:ph type="ftr" sz="quarter" idx="11"/>
-          </p:nvPr>
-        </p:nvSpPr>
-        <p:spPr/>
-        <p:txBody>
-          <a:bodyPr/>
-          <a:lstStyle/>
-          <a:p>
-            <a:pPr rtl="0"/>
-            <a:r>
-              <a:rPr lang="en-US"/>
-              <a:t>Groupe 2</a:t>
-            </a:r>
-            <a:endParaRPr lang="en-US" dirty="0"/>
-          </a:p>
-        </p:txBody>
-      </p:sp>
-      <p:sp>
-        <p:nvSpPr>
-          <p:cNvPr id="13" name="Espace réservé du numéro de diapositive 12">
-            <a:extLst>
-              <a:ext uri="{FF2B5EF4-FFF2-40B4-BE49-F238E27FC236}">
-                <a16:creationId xmlns:a16="http://schemas.microsoft.com/office/drawing/2014/main" id="{8641510F-2530-E138-62C6-E5382DA540D5}"/>
-              </a:ext>
-            </a:extLst>
-          </p:cNvPr>
-          <p:cNvSpPr>
-            <a:spLocks noGrp="1"/>
-          </p:cNvSpPr>
-          <p:nvPr>
-            <p:ph type="sldNum" sz="quarter" idx="12"/>
-          </p:nvPr>
-        </p:nvSpPr>
-        <p:spPr/>
-        <p:txBody>
-          <a:bodyPr/>
-          <a:lstStyle/>
-          <a:p>
-            <a:pPr rtl="0"/>
-            <a:fld id="{3A98EE3D-8CD1-4C3F-BD1C-C98C9596463C}" type="slidenum">
-              <a:rPr lang="en-US" smtClean="0"/>
-              <a:t>5</a:t>
-            </a:fld>
-            <a:endParaRPr lang="en-US" dirty="0"/>
-          </a:p>
-        </p:txBody>
-      </p:sp>
-    </p:spTree>
-    <p:extLst>
-      <p:ext uri="{BB962C8B-B14F-4D97-AF65-F5344CB8AC3E}">
-        <p14:creationId xmlns:p14="http://schemas.microsoft.com/office/powerpoint/2010/main" val="2004856534"/>
-      </p:ext>
-    </p:extLst>
-  </p:cSld>
-  <p:clrMapOvr>
-    <a:masterClrMapping/>
-  </p:clrMapOvr>
 </p:sld>
 </file>
 
@@ -8179,6 +8254,397 @@
           <a:chExt cx="0" cy="0"/>
         </a:xfrm>
       </p:grpSpPr>
+      <p:pic>
+        <p:nvPicPr>
+          <p:cNvPr id="9" name="Image 8">
+            <a:extLst>
+              <a:ext uri="{FF2B5EF4-FFF2-40B4-BE49-F238E27FC236}">
+                <a16:creationId xmlns:a16="http://schemas.microsoft.com/office/drawing/2014/main" id="{D6C7685E-5181-6321-887E-00974D9E86D4}"/>
+              </a:ext>
+            </a:extLst>
+          </p:cNvPr>
+          <p:cNvPicPr>
+            <a:picLocks noChangeAspect="1"/>
+          </p:cNvPicPr>
+          <p:nvPr/>
+        </p:nvPicPr>
+        <p:blipFill>
+          <a:blip r:embed="rId2">
+            <a:extLst>
+              <a:ext uri="{28A0092B-C50C-407E-A947-70E740481C1C}">
+                <a14:useLocalDpi xmlns:a14="http://schemas.microsoft.com/office/drawing/2010/main" val="0"/>
+              </a:ext>
+            </a:extLst>
+          </a:blip>
+          <a:stretch>
+            <a:fillRect/>
+          </a:stretch>
+        </p:blipFill>
+        <p:spPr>
+          <a:xfrm>
+            <a:off x="8664575" y="1256250"/>
+            <a:ext cx="3334988" cy="2217767"/>
+          </a:xfrm>
+          <a:prstGeom prst="rect">
+            <a:avLst/>
+          </a:prstGeom>
+        </p:spPr>
+      </p:pic>
+      <p:sp>
+        <p:nvSpPr>
+          <p:cNvPr id="2" name="Titre 1">
+            <a:extLst>
+              <a:ext uri="{FF2B5EF4-FFF2-40B4-BE49-F238E27FC236}">
+                <a16:creationId xmlns:a16="http://schemas.microsoft.com/office/drawing/2014/main" id="{CEE61FAD-F7D8-7EFE-12F4-D1AD2E6FDDB8}"/>
+              </a:ext>
+            </a:extLst>
+          </p:cNvPr>
+          <p:cNvSpPr>
+            <a:spLocks noGrp="1"/>
+          </p:cNvSpPr>
+          <p:nvPr>
+            <p:ph type="title"/>
+          </p:nvPr>
+        </p:nvSpPr>
+        <p:spPr>
+          <a:xfrm>
+            <a:off x="581192" y="702156"/>
+            <a:ext cx="11029616" cy="878671"/>
+          </a:xfrm>
+        </p:spPr>
+        <p:txBody>
+          <a:bodyPr>
+            <a:noAutofit/>
+          </a:bodyPr>
+          <a:lstStyle/>
+          <a:p>
+            <a:r>
+              <a:rPr lang="fr-FR" sz="4400" dirty="0"/>
+              <a:t>Analyse</a:t>
+            </a:r>
+          </a:p>
+        </p:txBody>
+      </p:sp>
+      <p:sp>
+        <p:nvSpPr>
+          <p:cNvPr id="3" name="Espace réservé du contenu 2">
+            <a:extLst>
+              <a:ext uri="{FF2B5EF4-FFF2-40B4-BE49-F238E27FC236}">
+                <a16:creationId xmlns:a16="http://schemas.microsoft.com/office/drawing/2014/main" id="{C8942728-87B6-14CE-2896-70B000AD41F2}"/>
+              </a:ext>
+            </a:extLst>
+          </p:cNvPr>
+          <p:cNvSpPr>
+            <a:spLocks noGrp="1"/>
+          </p:cNvSpPr>
+          <p:nvPr>
+            <p:ph idx="1"/>
+          </p:nvPr>
+        </p:nvSpPr>
+        <p:spPr>
+          <a:xfrm>
+            <a:off x="581192" y="1704814"/>
+            <a:ext cx="11029615" cy="4270536"/>
+          </a:xfrm>
+        </p:spPr>
+        <p:txBody>
+          <a:bodyPr>
+            <a:normAutofit lnSpcReduction="10000"/>
+          </a:bodyPr>
+          <a:lstStyle/>
+          <a:p>
+            <a:pPr marL="0" indent="0" algn="l">
+              <a:buNone/>
+            </a:pPr>
+            <a:r>
+              <a:rPr lang="fr-FR" sz="3200" b="1" dirty="0">
+                <a:solidFill>
+                  <a:schemeClr val="accent1"/>
+                </a:solidFill>
+              </a:rPr>
+              <a:t>Évaluation des Sources et Fiabilité des Informations</a:t>
+            </a:r>
+          </a:p>
+          <a:p>
+            <a:pPr algn="l">
+              <a:buFont typeface="Wingdings" panose="05000000000000000000" pitchFamily="2" charset="2"/>
+              <a:buChar char="q"/>
+            </a:pPr>
+            <a:r>
+              <a:rPr lang="fr-FR" sz="2400" dirty="0">
+                <a:solidFill>
+                  <a:schemeClr val="tx1"/>
+                </a:solidFill>
+              </a:rPr>
+              <a:t>Analyse basée sur des critères stricts : Fiabilité, Pertinence et Qualité.</a:t>
+            </a:r>
+          </a:p>
+          <a:p>
+            <a:pPr algn="l">
+              <a:buFont typeface="Wingdings" panose="05000000000000000000" pitchFamily="2" charset="2"/>
+              <a:buChar char="q"/>
+            </a:pPr>
+            <a:r>
+              <a:rPr lang="fr-FR" sz="2400" dirty="0">
+                <a:solidFill>
+                  <a:schemeClr val="tx1"/>
+                </a:solidFill>
+              </a:rPr>
+              <a:t>Examen détaillé de trois sources principales :</a:t>
+            </a:r>
+          </a:p>
+          <a:p>
+            <a:pPr marL="800100" lvl="1" indent="-342900" algn="l">
+              <a:buFont typeface="Wingdings" panose="05000000000000000000" pitchFamily="2" charset="2"/>
+              <a:buChar char="§"/>
+            </a:pPr>
+            <a:r>
+              <a:rPr lang="fr-FR" sz="2000" dirty="0">
+                <a:solidFill>
+                  <a:schemeClr val="accent1"/>
+                </a:solidFill>
+              </a:rPr>
+              <a:t>Afrique-Agriculture (</a:t>
+            </a:r>
+            <a:r>
+              <a:rPr lang="fr-FR" sz="2000" dirty="0">
+                <a:solidFill>
+                  <a:schemeClr val="accent1"/>
+                </a:solidFill>
+                <a:hlinkClick r:id="rId3">
+                  <a:extLst>
+                    <a:ext uri="{A12FA001-AC4F-418D-AE19-62706E023703}">
+                      <ahyp:hlinkClr xmlns:ahyp="http://schemas.microsoft.com/office/drawing/2018/hyperlinkcolor" val="tx"/>
+                    </a:ext>
+                  </a:extLst>
+                </a:hlinkClick>
+              </a:rPr>
+              <a:t>www.afrique-agriculture.org</a:t>
+            </a:r>
+            <a:r>
+              <a:rPr lang="fr-FR" sz="2000" dirty="0">
+                <a:solidFill>
+                  <a:schemeClr val="accent1"/>
+                </a:solidFill>
+              </a:rPr>
+              <a:t>)</a:t>
+            </a:r>
+          </a:p>
+          <a:p>
+            <a:pPr marL="800100" lvl="1" indent="-342900" algn="l">
+              <a:buFont typeface="Wingdings" panose="05000000000000000000" pitchFamily="2" charset="2"/>
+              <a:buChar char="§"/>
+            </a:pPr>
+            <a:r>
+              <a:rPr lang="fr-FR" sz="2000" dirty="0">
+                <a:solidFill>
+                  <a:schemeClr val="accent1"/>
+                </a:solidFill>
+              </a:rPr>
+              <a:t>La page agriculture d’Afrique la tribune (</a:t>
+            </a:r>
+            <a:r>
+              <a:rPr lang="fr-FR" sz="2000" dirty="0">
+                <a:solidFill>
+                  <a:schemeClr val="accent1"/>
+                </a:solidFill>
+                <a:hlinkClick r:id="rId4">
+                  <a:extLst>
+                    <a:ext uri="{A12FA001-AC4F-418D-AE19-62706E023703}">
+                      <ahyp:hlinkClr xmlns:ahyp="http://schemas.microsoft.com/office/drawing/2018/hyperlinkcolor" val="tx"/>
+                    </a:ext>
+                  </a:extLst>
+                </a:hlinkClick>
+              </a:rPr>
+              <a:t>www.afrique.latribune.fr/entreprises/agriculture</a:t>
+            </a:r>
+            <a:r>
+              <a:rPr lang="fr-FR" sz="2000" dirty="0">
+                <a:solidFill>
+                  <a:schemeClr val="accent1"/>
+                </a:solidFill>
+              </a:rPr>
+              <a:t>)</a:t>
+            </a:r>
+          </a:p>
+          <a:p>
+            <a:pPr marL="800100" lvl="1" indent="-342900" algn="l">
+              <a:buFont typeface="Wingdings" panose="05000000000000000000" pitchFamily="2" charset="2"/>
+              <a:buChar char="§"/>
+            </a:pPr>
+            <a:r>
+              <a:rPr lang="fr-FR" sz="2000" dirty="0">
+                <a:solidFill>
+                  <a:schemeClr val="accent1"/>
+                </a:solidFill>
+              </a:rPr>
+              <a:t>La page agriculture de </a:t>
+            </a:r>
+            <a:r>
+              <a:rPr lang="fr-FR" sz="2000" dirty="0" err="1">
+                <a:solidFill>
+                  <a:schemeClr val="accent1"/>
+                </a:solidFill>
+              </a:rPr>
+              <a:t>scidev</a:t>
+            </a:r>
+            <a:r>
+              <a:rPr lang="fr-FR" sz="2000" dirty="0">
+                <a:solidFill>
+                  <a:schemeClr val="accent1"/>
+                </a:solidFill>
+              </a:rPr>
+              <a:t> (</a:t>
+            </a:r>
+            <a:r>
+              <a:rPr lang="fr-FR" sz="2000" dirty="0">
+                <a:solidFill>
+                  <a:schemeClr val="accent1"/>
+                </a:solidFill>
+                <a:hlinkClick r:id="rId5">
+                  <a:extLst>
+                    <a:ext uri="{A12FA001-AC4F-418D-AE19-62706E023703}">
+                      <ahyp:hlinkClr xmlns:ahyp="http://schemas.microsoft.com/office/drawing/2018/hyperlinkcolor" val="tx"/>
+                    </a:ext>
+                  </a:extLst>
+                </a:hlinkClick>
+              </a:rPr>
+              <a:t>www.scidev.net/afrique-sub-saharienne/agriculture</a:t>
+            </a:r>
+            <a:r>
+              <a:rPr lang="fr-FR" sz="2000" dirty="0">
+                <a:solidFill>
+                  <a:schemeClr val="accent1"/>
+                </a:solidFill>
+              </a:rPr>
+              <a:t>)</a:t>
+            </a:r>
+          </a:p>
+          <a:p>
+            <a:pPr algn="l">
+              <a:buFont typeface="Wingdings" panose="05000000000000000000" pitchFamily="2" charset="2"/>
+              <a:buChar char="q"/>
+            </a:pPr>
+            <a:r>
+              <a:rPr lang="fr-FR" sz="2400" dirty="0">
+                <a:solidFill>
+                  <a:schemeClr val="tx1"/>
+                </a:solidFill>
+              </a:rPr>
+              <a:t>Critères d'évaluation : </a:t>
+            </a:r>
+            <a:r>
+              <a:rPr lang="fr-FR" sz="2400" b="1" dirty="0">
+                <a:solidFill>
+                  <a:schemeClr val="tx1"/>
+                </a:solidFill>
+              </a:rPr>
+              <a:t>Auteur, Publication et diffusion, Objectif, Date, Nature du document, Transmission de l'information, Vérification des informations, Domaine expertise, Crédibilité, Mise à jour régulière, Qualité du contenu</a:t>
+            </a:r>
+            <a:r>
+              <a:rPr lang="fr-FR" sz="2400" dirty="0">
+                <a:solidFill>
+                  <a:schemeClr val="tx1"/>
+                </a:solidFill>
+              </a:rPr>
+              <a:t>.</a:t>
+            </a:r>
+          </a:p>
+          <a:p>
+            <a:endParaRPr lang="fr-FR" dirty="0"/>
+          </a:p>
+        </p:txBody>
+      </p:sp>
+      <p:sp>
+        <p:nvSpPr>
+          <p:cNvPr id="10" name="Espace réservé du pied de page 9">
+            <a:extLst>
+              <a:ext uri="{FF2B5EF4-FFF2-40B4-BE49-F238E27FC236}">
+                <a16:creationId xmlns:a16="http://schemas.microsoft.com/office/drawing/2014/main" id="{C5FB9840-59C4-B070-F34B-20AEC56DA5EE}"/>
+              </a:ext>
+            </a:extLst>
+          </p:cNvPr>
+          <p:cNvSpPr>
+            <a:spLocks noGrp="1"/>
+          </p:cNvSpPr>
+          <p:nvPr>
+            <p:ph type="ftr" sz="quarter" idx="11"/>
+          </p:nvPr>
+        </p:nvSpPr>
+        <p:spPr/>
+        <p:txBody>
+          <a:bodyPr/>
+          <a:lstStyle/>
+          <a:p>
+            <a:pPr rtl="0"/>
+            <a:r>
+              <a:rPr lang="en-US"/>
+              <a:t>Groupe 2</a:t>
+            </a:r>
+            <a:endParaRPr lang="en-US" dirty="0"/>
+          </a:p>
+        </p:txBody>
+      </p:sp>
+      <p:sp>
+        <p:nvSpPr>
+          <p:cNvPr id="13" name="Espace réservé du numéro de diapositive 12">
+            <a:extLst>
+              <a:ext uri="{FF2B5EF4-FFF2-40B4-BE49-F238E27FC236}">
+                <a16:creationId xmlns:a16="http://schemas.microsoft.com/office/drawing/2014/main" id="{8641510F-2530-E138-62C6-E5382DA540D5}"/>
+              </a:ext>
+            </a:extLst>
+          </p:cNvPr>
+          <p:cNvSpPr>
+            <a:spLocks noGrp="1"/>
+          </p:cNvSpPr>
+          <p:nvPr>
+            <p:ph type="sldNum" sz="quarter" idx="12"/>
+          </p:nvPr>
+        </p:nvSpPr>
+        <p:spPr/>
+        <p:txBody>
+          <a:bodyPr/>
+          <a:lstStyle/>
+          <a:p>
+            <a:pPr rtl="0"/>
+            <a:fld id="{3A98EE3D-8CD1-4C3F-BD1C-C98C9596463C}" type="slidenum">
+              <a:rPr lang="en-US" smtClean="0"/>
+              <a:t>6</a:t>
+            </a:fld>
+            <a:endParaRPr lang="en-US" dirty="0"/>
+          </a:p>
+        </p:txBody>
+      </p:sp>
+    </p:spTree>
+    <p:extLst>
+      <p:ext uri="{BB962C8B-B14F-4D97-AF65-F5344CB8AC3E}">
+        <p14:creationId xmlns:p14="http://schemas.microsoft.com/office/powerpoint/2010/main" val="2004856534"/>
+      </p:ext>
+    </p:extLst>
+  </p:cSld>
+  <p:clrMapOvr>
+    <a:masterClrMapping/>
+  </p:clrMapOvr>
+</p:sld>
+</file>
+
+<file path=ppt/slides/slide7.xml><?xml version="1.0" encoding="utf-8"?>
+<p:sld xmlns:a="http://schemas.openxmlformats.org/drawingml/2006/main" xmlns:r="http://schemas.openxmlformats.org/officeDocument/2006/relationships" xmlns:p="http://schemas.openxmlformats.org/presentationml/2006/main">
+  <p:cSld>
+    <p:spTree>
+      <p:nvGrpSpPr>
+        <p:cNvPr id="1" name=""/>
+        <p:cNvGrpSpPr/>
+        <p:nvPr/>
+      </p:nvGrpSpPr>
+      <p:grpSpPr>
+        <a:xfrm>
+          <a:off x="0" y="0"/>
+          <a:ext cx="0" cy="0"/>
+          <a:chOff x="0" y="0"/>
+          <a:chExt cx="0" cy="0"/>
+        </a:xfrm>
+      </p:grpSpPr>
       <p:sp>
         <p:nvSpPr>
           <p:cNvPr id="2" name="Titre 1">
@@ -8384,7 +8850,7 @@
             <a:pPr rtl="0"/>
             <a:fld id="{3A98EE3D-8CD1-4C3F-BD1C-C98C9596463C}" type="slidenum">
               <a:rPr lang="en-US" smtClean="0"/>
-              <a:t>6</a:t>
+              <a:t>7</a:t>
             </a:fld>
             <a:endParaRPr lang="en-US" dirty="0"/>
           </a:p>
@@ -8400,13 +8866,13 @@
   <p:clrMapOvr>
     <a:masterClrMapping/>
   </p:clrMapOvr>
-  <mc:AlternateContent xmlns:mc="http://schemas.openxmlformats.org/markup-compatibility/2006">
-    <mc:Choice xmlns:p14="http://schemas.microsoft.com/office/powerpoint/2010/main" Requires="p14">
+  <mc:AlternateContent xmlns:mc="http://schemas.openxmlformats.org/markup-compatibility/2006" xmlns:p14="http://schemas.microsoft.com/office/powerpoint/2010/main">
+    <mc:Choice Requires="p14">
       <p:transition spd="slow" p14:dur="1600">
         <p14:prism isInverted="1"/>
       </p:transition>
     </mc:Choice>
-    <mc:Fallback>
+    <mc:Fallback xmlns="">
       <p:transition spd="slow">
         <p:fade/>
       </p:transition>
@@ -8415,7 +8881,7 @@
 </p:sld>
 </file>
 
-<file path=ppt/slides/slide7.xml><?xml version="1.0" encoding="utf-8"?>
+<file path=ppt/slides/slide8.xml><?xml version="1.0" encoding="utf-8"?>
 <p:sld xmlns:a="http://schemas.openxmlformats.org/drawingml/2006/main" xmlns:r="http://schemas.openxmlformats.org/officeDocument/2006/relationships" xmlns:p="http://schemas.openxmlformats.org/presentationml/2006/main">
   <p:cSld>
     <p:spTree>
@@ -10338,7 +10804,7 @@
             <a:pPr rtl="0"/>
             <a:fld id="{3A98EE3D-8CD1-4C3F-BD1C-C98C9596463C}" type="slidenum">
               <a:rPr lang="en-US" smtClean="0"/>
-              <a:t>7</a:t>
+              <a:t>8</a:t>
             </a:fld>
             <a:endParaRPr lang="en-US" dirty="0"/>
           </a:p>
@@ -10357,7 +10823,7 @@
 </p:sld>
 </file>
 
-<file path=ppt/slides/slide8.xml><?xml version="1.0" encoding="utf-8"?>
+<file path=ppt/slides/slide9.xml><?xml version="1.0" encoding="utf-8"?>
 <p:sld xmlns:a="http://schemas.openxmlformats.org/drawingml/2006/main" xmlns:r="http://schemas.openxmlformats.org/officeDocument/2006/relationships" xmlns:p="http://schemas.openxmlformats.org/presentationml/2006/main">
   <p:cSld>
     <p:spTree>
@@ -11726,7 +12192,7 @@
             <a:pPr rtl="0"/>
             <a:fld id="{3A98EE3D-8CD1-4C3F-BD1C-C98C9596463C}" type="slidenum">
               <a:rPr lang="en-US" smtClean="0"/>
-              <a:t>8</a:t>
+              <a:t>9</a:t>
             </a:fld>
             <a:endParaRPr lang="en-US" dirty="0"/>
           </a:p>
@@ -11742,226 +12208,18 @@
   <p:clrMapOvr>
     <a:masterClrMapping/>
   </p:clrMapOvr>
-  <mc:AlternateContent xmlns:mc="http://schemas.openxmlformats.org/markup-compatibility/2006">
-    <mc:Choice xmlns:p14="http://schemas.microsoft.com/office/powerpoint/2010/main" Requires="p14">
+  <mc:AlternateContent xmlns:mc="http://schemas.openxmlformats.org/markup-compatibility/2006" xmlns:p14="http://schemas.microsoft.com/office/powerpoint/2010/main">
+    <mc:Choice Requires="p14">
       <p:transition spd="slow" p14:dur="1250">
         <p14:switch dir="r"/>
       </p:transition>
     </mc:Choice>
-    <mc:Fallback>
+    <mc:Fallback xmlns="">
       <p:transition spd="slow">
         <p:fade/>
       </p:transition>
     </mc:Fallback>
   </mc:AlternateContent>
-</p:sld>
-</file>
-
-<file path=ppt/slides/slide9.xml><?xml version="1.0" encoding="utf-8"?>
-<p:sld xmlns:a="http://schemas.openxmlformats.org/drawingml/2006/main" xmlns:r="http://schemas.openxmlformats.org/officeDocument/2006/relationships" xmlns:p="http://schemas.openxmlformats.org/presentationml/2006/main">
-  <p:cSld>
-    <p:spTree>
-      <p:nvGrpSpPr>
-        <p:cNvPr id="1" name=""/>
-        <p:cNvGrpSpPr/>
-        <p:nvPr/>
-      </p:nvGrpSpPr>
-      <p:grpSpPr>
-        <a:xfrm>
-          <a:off x="0" y="0"/>
-          <a:ext cx="0" cy="0"/>
-          <a:chOff x="0" y="0"/>
-          <a:chExt cx="0" cy="0"/>
-        </a:xfrm>
-      </p:grpSpPr>
-      <p:sp>
-        <p:nvSpPr>
-          <p:cNvPr id="2" name="Titre 1">
-            <a:extLst>
-              <a:ext uri="{FF2B5EF4-FFF2-40B4-BE49-F238E27FC236}">
-                <a16:creationId xmlns:a16="http://schemas.microsoft.com/office/drawing/2014/main" id="{1D004955-7170-034F-E95D-E73CA9D150F5}"/>
-              </a:ext>
-            </a:extLst>
-          </p:cNvPr>
-          <p:cNvSpPr>
-            <a:spLocks noGrp="1"/>
-          </p:cNvSpPr>
-          <p:nvPr>
-            <p:ph type="title"/>
-          </p:nvPr>
-        </p:nvSpPr>
-        <p:spPr>
-          <a:xfrm>
-            <a:off x="581192" y="702156"/>
-            <a:ext cx="11029616" cy="677193"/>
-          </a:xfrm>
-        </p:spPr>
-        <p:txBody>
-          <a:bodyPr>
-            <a:normAutofit fontScale="90000"/>
-          </a:bodyPr>
-          <a:lstStyle/>
-          <a:p>
-            <a:r>
-              <a:rPr lang="fr-FR" sz="4400" dirty="0"/>
-              <a:t>Diagramme de Cas d'Utilisation</a:t>
-            </a:r>
-          </a:p>
-        </p:txBody>
-      </p:sp>
-      <p:sp>
-        <p:nvSpPr>
-          <p:cNvPr id="3" name="Espace réservé du contenu 2">
-            <a:extLst>
-              <a:ext uri="{FF2B5EF4-FFF2-40B4-BE49-F238E27FC236}">
-                <a16:creationId xmlns:a16="http://schemas.microsoft.com/office/drawing/2014/main" id="{21F27DA6-5724-B887-17BB-D3990E70E696}"/>
-              </a:ext>
-            </a:extLst>
-          </p:cNvPr>
-          <p:cNvSpPr>
-            <a:spLocks noGrp="1"/>
-          </p:cNvSpPr>
-          <p:nvPr>
-            <p:ph idx="1"/>
-          </p:nvPr>
-        </p:nvSpPr>
-        <p:spPr>
-          <a:xfrm>
-            <a:off x="581192" y="1379349"/>
-            <a:ext cx="11029615" cy="960275"/>
-          </a:xfrm>
-        </p:spPr>
-        <p:txBody>
-          <a:bodyPr>
-            <a:normAutofit/>
-          </a:bodyPr>
-          <a:lstStyle/>
-          <a:p>
-            <a:pPr marL="0" indent="0">
-              <a:buNone/>
-            </a:pPr>
-            <a:r>
-              <a:rPr lang="fr-FR" sz="2400" b="1" dirty="0">
-                <a:solidFill>
-                  <a:schemeClr val="accent1"/>
-                </a:solidFill>
-              </a:rPr>
-              <a:t>Illustration des cas d'utilisation d'Agri-Veille</a:t>
-            </a:r>
-          </a:p>
-        </p:txBody>
-      </p:sp>
-      <p:pic>
-        <p:nvPicPr>
-          <p:cNvPr id="5" name="Image 4">
-            <a:extLst>
-              <a:ext uri="{FF2B5EF4-FFF2-40B4-BE49-F238E27FC236}">
-                <a16:creationId xmlns:a16="http://schemas.microsoft.com/office/drawing/2014/main" id="{D634AC9D-4D26-8B17-ADDA-A354ED764E46}"/>
-              </a:ext>
-            </a:extLst>
-          </p:cNvPr>
-          <p:cNvPicPr>
-            <a:picLocks noChangeAspect="1"/>
-          </p:cNvPicPr>
-          <p:nvPr/>
-        </p:nvPicPr>
-        <p:blipFill>
-          <a:blip r:embed="rId2">
-            <a:extLst>
-              <a:ext uri="{28A0092B-C50C-407E-A947-70E740481C1C}">
-                <a14:useLocalDpi xmlns:a14="http://schemas.microsoft.com/office/drawing/2010/main" val="0"/>
-              </a:ext>
-            </a:extLst>
-          </a:blip>
-          <a:srcRect/>
-          <a:stretch>
-            <a:fillRect/>
-          </a:stretch>
-        </p:blipFill>
-        <p:spPr bwMode="auto">
-          <a:xfrm>
-            <a:off x="3029659" y="2339624"/>
-            <a:ext cx="6563792" cy="4051000"/>
-          </a:xfrm>
-          <a:prstGeom prst="rect">
-            <a:avLst/>
-          </a:prstGeom>
-          <a:noFill/>
-          <a:ln>
-            <a:noFill/>
-          </a:ln>
-        </p:spPr>
-      </p:pic>
-      <p:sp>
-        <p:nvSpPr>
-          <p:cNvPr id="6" name="Espace réservé du pied de page 5">
-            <a:extLst>
-              <a:ext uri="{FF2B5EF4-FFF2-40B4-BE49-F238E27FC236}">
-                <a16:creationId xmlns:a16="http://schemas.microsoft.com/office/drawing/2014/main" id="{1CC44C46-7C58-3532-CF56-6DBCEE671726}"/>
-              </a:ext>
-            </a:extLst>
-          </p:cNvPr>
-          <p:cNvSpPr>
-            <a:spLocks noGrp="1"/>
-          </p:cNvSpPr>
-          <p:nvPr>
-            <p:ph type="ftr" sz="quarter" idx="11"/>
-          </p:nvPr>
-        </p:nvSpPr>
-        <p:spPr/>
-        <p:txBody>
-          <a:bodyPr/>
-          <a:lstStyle/>
-          <a:p>
-            <a:pPr rtl="0"/>
-            <a:r>
-              <a:rPr lang="en-US"/>
-              <a:t>Groupe 2</a:t>
-            </a:r>
-            <a:endParaRPr lang="en-US" dirty="0"/>
-          </a:p>
-        </p:txBody>
-      </p:sp>
-      <p:sp>
-        <p:nvSpPr>
-          <p:cNvPr id="9" name="Espace réservé du numéro de diapositive 8">
-            <a:extLst>
-              <a:ext uri="{FF2B5EF4-FFF2-40B4-BE49-F238E27FC236}">
-                <a16:creationId xmlns:a16="http://schemas.microsoft.com/office/drawing/2014/main" id="{A39173EF-CA36-6D20-3BDD-76E22CB95504}"/>
-              </a:ext>
-            </a:extLst>
-          </p:cNvPr>
-          <p:cNvSpPr>
-            <a:spLocks noGrp="1"/>
-          </p:cNvSpPr>
-          <p:nvPr>
-            <p:ph type="sldNum" sz="quarter" idx="12"/>
-          </p:nvPr>
-        </p:nvSpPr>
-        <p:spPr/>
-        <p:txBody>
-          <a:bodyPr/>
-          <a:lstStyle/>
-          <a:p>
-            <a:pPr rtl="0"/>
-            <a:fld id="{3A98EE3D-8CD1-4C3F-BD1C-C98C9596463C}" type="slidenum">
-              <a:rPr lang="en-US" smtClean="0"/>
-              <a:t>9</a:t>
-            </a:fld>
-            <a:endParaRPr lang="en-US" dirty="0"/>
-          </a:p>
-        </p:txBody>
-      </p:sp>
-    </p:spTree>
-    <p:extLst>
-      <p:ext uri="{BB962C8B-B14F-4D97-AF65-F5344CB8AC3E}">
-        <p14:creationId xmlns:p14="http://schemas.microsoft.com/office/powerpoint/2010/main" val="4216241999"/>
-      </p:ext>
-    </p:extLst>
-  </p:cSld>
-  <p:clrMapOvr>
-    <a:masterClrMapping/>
-  </p:clrMapOvr>
 </p:sld>
 </file>
 

</xml_diff>